<commit_message>
Temp: more analysis on line-in noise
</commit_message>
<xml_diff>
--- a/Working/2016-10-20 LineIn Noise Exploration.pptx
+++ b/Working/2016-10-20 LineIn Noise Exploration.pptx
@@ -4126,14 +4126,27 @@
             <p:ph type="title"/>
           </p:nvPr>
         </p:nvSpPr>
-        <p:spPr/>
+        <p:spPr>
+          <a:xfrm>
+            <a:off x="457200" y="76200"/>
+            <a:ext cx="8229600" cy="1143000"/>
+          </a:xfrm>
+        </p:spPr>
         <p:txBody>
           <a:bodyPr/>
           <a:lstStyle/>
           <a:p>
             <a:r>
               <a:rPr lang="en-US" dirty="0" smtClean="0"/>
-              <a:t>Effect of Mics vs Shorted</a:t>
+              <a:t>Effect of </a:t>
+            </a:r>
+            <a:r>
+              <a:rPr lang="en-US" dirty="0" smtClean="0"/>
+              <a:t>Shorting </a:t>
+            </a:r>
+            <a:r>
+              <a:rPr lang="en-US" smtClean="0"/>
+              <a:t>the Input</a:t>
             </a:r>
             <a:endParaRPr lang="en-US" dirty="0"/>
           </a:p>
@@ -4162,7 +4175,7 @@
         </p:blipFill>
         <p:spPr bwMode="auto">
           <a:xfrm>
-            <a:off x="2438400" y="990600"/>
+            <a:off x="575417" y="990600"/>
             <a:ext cx="4126024" cy="5159375"/>
           </a:xfrm>
           <a:prstGeom prst="rect">
@@ -4233,6 +4246,114 @@
             <a:r>
               <a:rPr lang="en-US" dirty="0" smtClean="0"/>
               <a:t>The mics and the shorted inputs give the same noise.  So, the line-in noise is louder than the ambient sound picked up by the mics (in my kitchen).  Also, the line-in noise is present even when shorted…wow!</a:t>
+            </a:r>
+            <a:endParaRPr lang="en-US" dirty="0"/>
+          </a:p>
+        </p:txBody>
+      </p:sp>
+      <p:pic>
+        <p:nvPicPr>
+          <p:cNvPr id="3" name="Picture 2"/>
+          <p:cNvPicPr>
+            <a:picLocks noChangeAspect="1" noChangeArrowheads="1"/>
+          </p:cNvPicPr>
+          <p:nvPr/>
+        </p:nvPicPr>
+        <p:blipFill>
+          <a:blip r:embed="rId3">
+            <a:extLst>
+              <a:ext uri="{28A0092B-C50C-407E-A947-70E740481C1C}">
+                <a14:useLocalDpi xmlns:a14="http://schemas.microsoft.com/office/drawing/2010/main" val="0"/>
+              </a:ext>
+            </a:extLst>
+          </a:blip>
+          <a:srcRect/>
+          <a:stretch>
+            <a:fillRect/>
+          </a:stretch>
+        </p:blipFill>
+        <p:spPr bwMode="auto">
+          <a:xfrm>
+            <a:off x="4729514" y="993201"/>
+            <a:ext cx="4123944" cy="5156774"/>
+          </a:xfrm>
+          <a:prstGeom prst="rect">
+            <a:avLst/>
+          </a:prstGeom>
+          <a:noFill/>
+          <a:ln>
+            <a:noFill/>
+          </a:ln>
+          <a:effectLst/>
+          <a:extLst>
+            <a:ext uri="{909E8E84-426E-40DD-AFC4-6F175D3DCCD1}">
+              <a14:hiddenFill xmlns:a14="http://schemas.microsoft.com/office/drawing/2010/main">
+                <a:solidFill>
+                  <a:schemeClr val="accent1"/>
+                </a:solidFill>
+              </a14:hiddenFill>
+            </a:ext>
+            <a:ext uri="{91240B29-F687-4F45-9708-019B960494DF}">
+              <a14:hiddenLine xmlns:a14="http://schemas.microsoft.com/office/drawing/2010/main" w="9525">
+                <a:solidFill>
+                  <a:schemeClr val="tx1"/>
+                </a:solidFill>
+                <a:miter lim="800000"/>
+                <a:headEnd/>
+                <a:tailEnd/>
+              </a14:hiddenLine>
+            </a:ext>
+            <a:ext uri="{AF507438-7753-43E0-B8FC-AC1667EBCBE1}">
+              <a14:hiddenEffects xmlns:a14="http://schemas.microsoft.com/office/drawing/2010/main">
+                <a:effectLst>
+                  <a:outerShdw dist="35921" dir="2700000" algn="ctr" rotWithShape="0">
+                    <a:schemeClr val="bg2"/>
+                  </a:outerShdw>
+                </a:effectLst>
+              </a14:hiddenEffects>
+            </a:ext>
+          </a:extLst>
+        </p:spPr>
+      </p:pic>
+      <p:sp>
+        <p:nvSpPr>
+          <p:cNvPr id="4" name="Right Arrow 3"/>
+          <p:cNvSpPr/>
+          <p:nvPr/>
+        </p:nvSpPr>
+        <p:spPr>
+          <a:xfrm>
+            <a:off x="3962400" y="3124200"/>
+            <a:ext cx="1371600" cy="609600"/>
+          </a:xfrm>
+          <a:prstGeom prst="rightArrow">
+            <a:avLst/>
+          </a:prstGeom>
+        </p:spPr>
+        <p:style>
+          <a:lnRef idx="2">
+            <a:schemeClr val="accent1">
+              <a:shade val="50000"/>
+            </a:schemeClr>
+          </a:lnRef>
+          <a:fillRef idx="1">
+            <a:schemeClr val="accent1"/>
+          </a:fillRef>
+          <a:effectRef idx="0">
+            <a:schemeClr val="accent1"/>
+          </a:effectRef>
+          <a:fontRef idx="minor">
+            <a:schemeClr val="lt1"/>
+          </a:fontRef>
+        </p:style>
+        <p:txBody>
+          <a:bodyPr rtlCol="0" anchor="ctr"/>
+          <a:lstStyle/>
+          <a:p>
+            <a:pPr algn="ctr"/>
+            <a:r>
+              <a:rPr lang="en-US" dirty="0" smtClean="0"/>
+              <a:t>Repeat</a:t>
             </a:r>
             <a:endParaRPr lang="en-US" dirty="0"/>
           </a:p>

</xml_diff>